<commit_message>
Dia 2 - Prisma
</commit_message>
<xml_diff>
--- a/slides/Dia 1 - NesteJS.pptx
+++ b/slides/Dia 1 - NesteJS.pptx
@@ -7654,7 +7654,7 @@
           <a:p>
             <a:fld id="{08B4E44B-C3C0-4A78-BB99-E15763C34800}" type="datetimeFigureOut">
               <a:rPr lang="pt-BR" smtClean="0"/>
-              <a:t>06/01/2023</a:t>
+              <a:t>10/01/2023</a:t>
             </a:fld>
             <a:endParaRPr lang="pt-BR"/>
           </a:p>
@@ -9251,7 +9251,7 @@
           <a:p>
             <a:fld id="{2E700DB3-DBF0-4086-B675-117E7A9610B8}" type="datetimeFigureOut">
               <a:rPr lang="pt-BR" smtClean="0"/>
-              <a:t>06/01/2023</a:t>
+              <a:t>10/01/2023</a:t>
             </a:fld>
             <a:endParaRPr lang="pt-BR"/>
           </a:p>
@@ -9434,7 +9434,7 @@
           <a:p>
             <a:fld id="{2E700DB3-DBF0-4086-B675-117E7A9610B8}" type="datetimeFigureOut">
               <a:rPr lang="pt-BR" smtClean="0"/>
-              <a:t>06/01/2023</a:t>
+              <a:t>10/01/2023</a:t>
             </a:fld>
             <a:endParaRPr lang="pt-BR"/>
           </a:p>
@@ -9609,7 +9609,7 @@
           <a:p>
             <a:fld id="{2E700DB3-DBF0-4086-B675-117E7A9610B8}" type="datetimeFigureOut">
               <a:rPr lang="pt-BR" smtClean="0"/>
-              <a:t>06/01/2023</a:t>
+              <a:t>10/01/2023</a:t>
             </a:fld>
             <a:endParaRPr lang="pt-BR"/>
           </a:p>
@@ -9774,7 +9774,7 @@
           <a:p>
             <a:fld id="{2E700DB3-DBF0-4086-B675-117E7A9610B8}" type="datetimeFigureOut">
               <a:rPr lang="pt-BR" smtClean="0"/>
-              <a:t>06/01/2023</a:t>
+              <a:t>10/01/2023</a:t>
             </a:fld>
             <a:endParaRPr lang="pt-BR"/>
           </a:p>
@@ -9995,7 +9995,7 @@
           <a:p>
             <a:fld id="{2E700DB3-DBF0-4086-B675-117E7A9610B8}" type="datetimeFigureOut">
               <a:rPr lang="pt-BR" smtClean="0"/>
-              <a:t>06/01/2023</a:t>
+              <a:t>10/01/2023</a:t>
             </a:fld>
             <a:endParaRPr lang="pt-BR"/>
           </a:p>
@@ -10254,7 +10254,7 @@
           <a:p>
             <a:fld id="{2E700DB3-DBF0-4086-B675-117E7A9610B8}" type="datetimeFigureOut">
               <a:rPr lang="pt-BR" smtClean="0"/>
-              <a:t>06/01/2023</a:t>
+              <a:t>10/01/2023</a:t>
             </a:fld>
             <a:endParaRPr lang="pt-BR"/>
           </a:p>
@@ -10658,7 +10658,7 @@
           <a:p>
             <a:fld id="{2E700DB3-DBF0-4086-B675-117E7A9610B8}" type="datetimeFigureOut">
               <a:rPr lang="pt-BR" smtClean="0"/>
-              <a:t>06/01/2023</a:t>
+              <a:t>10/01/2023</a:t>
             </a:fld>
             <a:endParaRPr lang="pt-BR"/>
           </a:p>
@@ -10789,7 +10789,7 @@
           <a:p>
             <a:fld id="{2E700DB3-DBF0-4086-B675-117E7A9610B8}" type="datetimeFigureOut">
               <a:rPr lang="pt-BR" smtClean="0"/>
-              <a:t>06/01/2023</a:t>
+              <a:t>10/01/2023</a:t>
             </a:fld>
             <a:endParaRPr lang="pt-BR"/>
           </a:p>
@@ -10889,7 +10889,7 @@
           <a:p>
             <a:fld id="{2E700DB3-DBF0-4086-B675-117E7A9610B8}" type="datetimeFigureOut">
               <a:rPr lang="pt-BR" smtClean="0"/>
-              <a:t>06/01/2023</a:t>
+              <a:t>10/01/2023</a:t>
             </a:fld>
             <a:endParaRPr lang="pt-BR"/>
           </a:p>
@@ -11134,7 +11134,7 @@
           <a:p>
             <a:fld id="{2E700DB3-DBF0-4086-B675-117E7A9610B8}" type="datetimeFigureOut">
               <a:rPr lang="pt-BR" smtClean="0"/>
-              <a:t>06/01/2023</a:t>
+              <a:t>10/01/2023</a:t>
             </a:fld>
             <a:endParaRPr lang="pt-BR"/>
           </a:p>
@@ -11378,7 +11378,7 @@
           <a:p>
             <a:fld id="{2E700DB3-DBF0-4086-B675-117E7A9610B8}" type="datetimeFigureOut">
               <a:rPr lang="pt-BR" smtClean="0"/>
-              <a:t>06/01/2023</a:t>
+              <a:t>10/01/2023</a:t>
             </a:fld>
             <a:endParaRPr lang="pt-BR"/>
           </a:p>
@@ -12202,7 +12202,7 @@
           <a:p>
             <a:fld id="{2E700DB3-DBF0-4086-B675-117E7A9610B8}" type="datetimeFigureOut">
               <a:rPr lang="pt-BR" smtClean="0"/>
-              <a:t>06/01/2023</a:t>
+              <a:t>10/01/2023</a:t>
             </a:fld>
             <a:endParaRPr lang="pt-BR"/>
           </a:p>
@@ -12672,6 +12672,36 @@
           </a:p>
         </p:txBody>
       </p:sp>
+      <p:pic>
+        <p:nvPicPr>
+          <p:cNvPr id="4" name="Imagem 3">
+            <a:extLst>
+              <a:ext uri="{FF2B5EF4-FFF2-40B4-BE49-F238E27FC236}">
+                <a16:creationId xmlns:a16="http://schemas.microsoft.com/office/drawing/2014/main" id="{F613C944-56E7-0D07-6731-7F87FB402359}"/>
+              </a:ext>
+            </a:extLst>
+          </p:cNvPr>
+          <p:cNvPicPr>
+            <a:picLocks noChangeAspect="1"/>
+          </p:cNvPicPr>
+          <p:nvPr/>
+        </p:nvPicPr>
+        <p:blipFill>
+          <a:blip r:embed="rId2"/>
+          <a:stretch>
+            <a:fillRect/>
+          </a:stretch>
+        </p:blipFill>
+        <p:spPr>
+          <a:xfrm>
+            <a:off x="9264352" y="4329778"/>
+            <a:ext cx="1656763" cy="2230889"/>
+          </a:xfrm>
+          <a:prstGeom prst="rect">
+            <a:avLst/>
+          </a:prstGeom>
+        </p:spPr>
+      </p:pic>
     </p:spTree>
     <p:extLst>
       <p:ext uri="{BB962C8B-B14F-4D97-AF65-F5344CB8AC3E}">
@@ -12682,6 +12712,89 @@
   <p:clrMapOvr>
     <a:masterClrMapping/>
   </p:clrMapOvr>
+  <p:timing>
+    <p:tnLst>
+      <p:par>
+        <p:cTn id="1" dur="indefinite" restart="never" nodeType="tmRoot">
+          <p:childTnLst>
+            <p:seq concurrent="1" nextAc="seek">
+              <p:cTn id="2" dur="indefinite" nodeType="mainSeq">
+                <p:childTnLst>
+                  <p:par>
+                    <p:cTn id="3" fill="hold">
+                      <p:stCondLst>
+                        <p:cond delay="indefinite"/>
+                      </p:stCondLst>
+                      <p:childTnLst>
+                        <p:par>
+                          <p:cTn id="4" fill="hold">
+                            <p:stCondLst>
+                              <p:cond delay="0"/>
+                            </p:stCondLst>
+                            <p:childTnLst>
+                              <p:par>
+                                <p:cTn id="5" presetID="10" presetClass="entr" presetSubtype="0" fill="hold" nodeType="clickEffect">
+                                  <p:stCondLst>
+                                    <p:cond delay="0"/>
+                                  </p:stCondLst>
+                                  <p:childTnLst>
+                                    <p:set>
+                                      <p:cBhvr>
+                                        <p:cTn id="6" dur="1" fill="hold">
+                                          <p:stCondLst>
+                                            <p:cond delay="0"/>
+                                          </p:stCondLst>
+                                        </p:cTn>
+                                        <p:tgtEl>
+                                          <p:spTgt spid="4"/>
+                                        </p:tgtEl>
+                                        <p:attrNameLst>
+                                          <p:attrName>style.visibility</p:attrName>
+                                        </p:attrNameLst>
+                                      </p:cBhvr>
+                                      <p:to>
+                                        <p:strVal val="visible"/>
+                                      </p:to>
+                                    </p:set>
+                                    <p:animEffect transition="in" filter="fade">
+                                      <p:cBhvr>
+                                        <p:cTn id="7" dur="500"/>
+                                        <p:tgtEl>
+                                          <p:spTgt spid="4"/>
+                                        </p:tgtEl>
+                                      </p:cBhvr>
+                                    </p:animEffect>
+                                  </p:childTnLst>
+                                </p:cTn>
+                              </p:par>
+                            </p:childTnLst>
+                          </p:cTn>
+                        </p:par>
+                      </p:childTnLst>
+                    </p:cTn>
+                  </p:par>
+                </p:childTnLst>
+              </p:cTn>
+              <p:prevCondLst>
+                <p:cond evt="onPrev" delay="0">
+                  <p:tgtEl>
+                    <p:sldTgt/>
+                  </p:tgtEl>
+                </p:cond>
+              </p:prevCondLst>
+              <p:nextCondLst>
+                <p:cond evt="onNext" delay="0">
+                  <p:tgtEl>
+                    <p:sldTgt/>
+                  </p:tgtEl>
+                </p:cond>
+              </p:nextCondLst>
+            </p:seq>
+          </p:childTnLst>
+        </p:cTn>
+      </p:par>
+    </p:tnLst>
+  </p:timing>
 </p:sld>
 </file>
 
@@ -35603,8 +35716,8 @@
         </p:nvSpPr>
         <p:spPr>
           <a:xfrm>
-            <a:off x="6888088" y="425913"/>
-            <a:ext cx="4940968" cy="954107"/>
+            <a:off x="6888088" y="225309"/>
+            <a:ext cx="4940968" cy="1169551"/>
           </a:xfrm>
           <a:prstGeom prst="rect">
             <a:avLst/>
@@ -35651,8 +35764,26 @@
               <a:buChar char="-"/>
             </a:pPr>
             <a:r>
+              <a:rPr lang="pt-BR" sz="1400" dirty="0"/>
+              <a:t>Básico de Banco de Dados</a:t>
+            </a:r>
+          </a:p>
+          <a:p>
+            <a:pPr marL="285750" indent="-285750">
+              <a:buFontTx/>
+              <a:buChar char="-"/>
+            </a:pPr>
+            <a:r>
               <a:rPr lang="pt-BR" sz="1400" dirty="0" err="1"/>
               <a:t>Git</a:t>
+            </a:r>
+            <a:r>
+              <a:rPr lang="pt-BR" sz="1400" dirty="0"/>
+              <a:t> </a:t>
+            </a:r>
+            <a:r>
+              <a:rPr lang="pt-BR" sz="1400"/>
+              <a:t>(Opcional)</a:t>
             </a:r>
             <a:endParaRPr lang="pt-BR" sz="1400" dirty="0"/>
           </a:p>

</xml_diff>